<commit_message>
add an architecture diagram
</commit_message>
<xml_diff>
--- a/assets/Architecture.pptx
+++ b/assets/Architecture.pptx
@@ -4076,7 +4076,7 @@
         </p:nvSpPr>
         <p:spPr>
           <a:xfrm>
-            <a:off x="1574947" y="2840040"/>
+            <a:off x="2126091" y="2840040"/>
             <a:ext cx="5466329" cy="3533936"/>
           </a:xfrm>
           <a:prstGeom prst="rect">
@@ -4136,7 +4136,7 @@
         </p:nvSpPr>
         <p:spPr>
           <a:xfrm>
-            <a:off x="1705772" y="2968397"/>
+            <a:off x="2256916" y="2968397"/>
             <a:ext cx="5466329" cy="3533936"/>
           </a:xfrm>
           <a:prstGeom prst="rect">
@@ -4196,7 +4196,7 @@
         </p:nvSpPr>
         <p:spPr>
           <a:xfrm>
-            <a:off x="1377109" y="1874778"/>
+            <a:off x="1928253" y="1874778"/>
             <a:ext cx="8480874" cy="4881385"/>
           </a:xfrm>
           <a:prstGeom prst="rect">
@@ -4253,7 +4253,7 @@
         </p:nvSpPr>
         <p:spPr>
           <a:xfrm>
-            <a:off x="1831638" y="3092333"/>
+            <a:off x="2382782" y="3092333"/>
             <a:ext cx="5466329" cy="3533936"/>
           </a:xfrm>
           <a:prstGeom prst="rect">
@@ -4313,7 +4313,7 @@
         </p:nvSpPr>
         <p:spPr>
           <a:xfrm>
-            <a:off x="1905282" y="3174973"/>
+            <a:off x="2456426" y="3174973"/>
             <a:ext cx="5281074" cy="542032"/>
           </a:xfrm>
           <a:prstGeom prst="roundRect">
@@ -4373,7 +4373,7 @@
         </p:nvSpPr>
         <p:spPr>
           <a:xfrm>
-            <a:off x="1479164" y="1894379"/>
+            <a:off x="2030308" y="1894379"/>
             <a:ext cx="4335332" cy="261610"/>
           </a:xfrm>
           <a:prstGeom prst="rect">
@@ -4415,7 +4415,7 @@
         </p:nvSpPr>
         <p:spPr>
           <a:xfrm>
-            <a:off x="1905919" y="3863189"/>
+            <a:off x="2457063" y="3863189"/>
             <a:ext cx="5281074" cy="1695885"/>
           </a:xfrm>
           <a:prstGeom prst="roundRect">
@@ -4472,7 +4472,7 @@
         </p:nvSpPr>
         <p:spPr>
           <a:xfrm>
-            <a:off x="3732165" y="6275979"/>
+            <a:off x="4283309" y="6275979"/>
             <a:ext cx="1429049" cy="261610"/>
           </a:xfrm>
           <a:prstGeom prst="rect">
@@ -4515,7 +4515,7 @@
         </p:nvSpPr>
         <p:spPr>
           <a:xfrm>
-            <a:off x="2012221" y="4926168"/>
+            <a:off x="2563365" y="4926168"/>
             <a:ext cx="5067196" cy="548656"/>
           </a:xfrm>
           <a:prstGeom prst="roundRect">
@@ -4572,7 +4572,7 @@
         </p:nvSpPr>
         <p:spPr>
           <a:xfrm>
-            <a:off x="1998077" y="4918702"/>
+            <a:off x="2549221" y="4918702"/>
             <a:ext cx="1312396" cy="261610"/>
           </a:xfrm>
           <a:prstGeom prst="rect">
@@ -4628,7 +4628,7 @@
         </p:blipFill>
         <p:spPr>
           <a:xfrm>
-            <a:off x="7789392" y="2648295"/>
+            <a:off x="8340536" y="2648295"/>
             <a:ext cx="279755" cy="279755"/>
           </a:xfrm>
           <a:prstGeom prst="rect">
@@ -4650,7 +4650,7 @@
         </p:nvSpPr>
         <p:spPr>
           <a:xfrm>
-            <a:off x="7297967" y="2939942"/>
+            <a:off x="7849111" y="2939942"/>
             <a:ext cx="1312396" cy="261610"/>
           </a:xfrm>
           <a:prstGeom prst="rect">
@@ -4707,7 +4707,7 @@
         </p:blipFill>
         <p:spPr>
           <a:xfrm>
-            <a:off x="7814287" y="3245800"/>
+            <a:off x="8365431" y="3245800"/>
             <a:ext cx="279755" cy="279755"/>
           </a:xfrm>
           <a:prstGeom prst="rect">
@@ -4729,7 +4729,7 @@
         </p:nvSpPr>
         <p:spPr>
           <a:xfrm>
-            <a:off x="7286502" y="3545267"/>
+            <a:off x="7837646" y="3545267"/>
             <a:ext cx="1312396" cy="261610"/>
           </a:xfrm>
           <a:prstGeom prst="rect">
@@ -4786,7 +4786,7 @@
         </p:blipFill>
         <p:spPr>
           <a:xfrm>
-            <a:off x="7767875" y="5120665"/>
+            <a:off x="8319019" y="5120665"/>
             <a:ext cx="279755" cy="279755"/>
           </a:xfrm>
           <a:prstGeom prst="rect">
@@ -4808,7 +4808,7 @@
         </p:nvSpPr>
         <p:spPr>
           <a:xfrm>
-            <a:off x="7386118" y="5428269"/>
+            <a:off x="7937262" y="5428269"/>
             <a:ext cx="1051934" cy="261610"/>
           </a:xfrm>
           <a:prstGeom prst="rect">
@@ -4851,7 +4851,7 @@
         </p:nvSpPr>
         <p:spPr>
           <a:xfrm>
-            <a:off x="3106454" y="1064712"/>
+            <a:off x="3657598" y="1064712"/>
             <a:ext cx="6751529" cy="663880"/>
           </a:xfrm>
           <a:prstGeom prst="ellipse">
@@ -4918,7 +4918,7 @@
         </p:nvSpPr>
         <p:spPr>
           <a:xfrm>
-            <a:off x="8717947" y="3124833"/>
+            <a:off x="9269091" y="3124833"/>
             <a:ext cx="959453" cy="1865967"/>
           </a:xfrm>
           <a:prstGeom prst="roundRect">
@@ -5043,7 +5043,7 @@
         </p:nvSpPr>
         <p:spPr>
           <a:xfrm>
-            <a:off x="2012220" y="344377"/>
+            <a:off x="3940950" y="369494"/>
             <a:ext cx="1377323" cy="261610"/>
           </a:xfrm>
           <a:prstGeom prst="rect">
@@ -5099,7 +5099,7 @@
         </p:blipFill>
         <p:spPr>
           <a:xfrm>
-            <a:off x="8717947" y="179614"/>
+            <a:off x="9269091" y="179614"/>
             <a:ext cx="555172" cy="555172"/>
           </a:xfrm>
           <a:prstGeom prst="rect">
@@ -5121,7 +5121,7 @@
         </p:nvSpPr>
         <p:spPr>
           <a:xfrm>
-            <a:off x="9266259" y="326395"/>
+            <a:off x="9817403" y="326395"/>
             <a:ext cx="1377323" cy="261610"/>
           </a:xfrm>
           <a:prstGeom prst="rect">
@@ -5163,7 +5163,7 @@
         </p:nvSpPr>
         <p:spPr>
           <a:xfrm>
-            <a:off x="9030717" y="728748"/>
+            <a:off x="9581861" y="728748"/>
             <a:ext cx="1278203" cy="352723"/>
           </a:xfrm>
           <a:prstGeom prst="rect">
@@ -5242,7 +5242,7 @@
         </p:nvSpPr>
         <p:spPr>
           <a:xfrm>
-            <a:off x="7903601" y="728748"/>
+            <a:off x="8454745" y="728748"/>
             <a:ext cx="1091932" cy="352723"/>
           </a:xfrm>
           <a:prstGeom prst="rect">
@@ -5332,7 +5332,7 @@
         </p:nvGrpSpPr>
         <p:grpSpPr>
           <a:xfrm>
-            <a:off x="9289011" y="1225251"/>
+            <a:off x="9840155" y="1225251"/>
             <a:ext cx="309240" cy="1763640"/>
             <a:chOff x="9289011" y="1225251"/>
             <a:chExt cx="309240" cy="1763640"/>
@@ -5455,7 +5455,7 @@
         </p:nvSpPr>
         <p:spPr>
           <a:xfrm>
-            <a:off x="9697251" y="1278465"/>
+            <a:off x="10248395" y="1278465"/>
             <a:ext cx="1726345" cy="261610"/>
           </a:xfrm>
           <a:prstGeom prst="rect">
@@ -5503,7 +5503,7 @@
         </p:nvSpPr>
         <p:spPr>
           <a:xfrm>
-            <a:off x="2302608" y="4002406"/>
+            <a:off x="2853752" y="4002406"/>
             <a:ext cx="1312396" cy="261610"/>
           </a:xfrm>
           <a:prstGeom prst="rect">
@@ -5559,7 +5559,7 @@
         </p:blipFill>
         <p:spPr>
           <a:xfrm>
-            <a:off x="1978908" y="3964006"/>
+            <a:off x="2530052" y="3964006"/>
             <a:ext cx="323700" cy="323700"/>
           </a:xfrm>
           <a:prstGeom prst="rect">
@@ -5581,7 +5581,7 @@
         </p:nvSpPr>
         <p:spPr>
           <a:xfrm>
-            <a:off x="2014309" y="4276904"/>
+            <a:off x="2565453" y="4276904"/>
             <a:ext cx="5067196" cy="548656"/>
           </a:xfrm>
           <a:prstGeom prst="roundRect">
@@ -5638,7 +5638,7 @@
         </p:nvSpPr>
         <p:spPr>
           <a:xfrm>
-            <a:off x="2000165" y="4269438"/>
+            <a:off x="2551309" y="4269438"/>
             <a:ext cx="1312396" cy="261610"/>
           </a:xfrm>
           <a:prstGeom prst="rect">
@@ -5694,7 +5694,7 @@
         </p:blipFill>
         <p:spPr>
           <a:xfrm>
-            <a:off x="3458080" y="3232505"/>
+            <a:off x="4009224" y="3232505"/>
             <a:ext cx="413776" cy="413776"/>
           </a:xfrm>
           <a:prstGeom prst="rect">
@@ -5716,7 +5716,7 @@
         </p:nvSpPr>
         <p:spPr>
           <a:xfrm>
-            <a:off x="3871856" y="3317135"/>
+            <a:off x="4423000" y="3317135"/>
             <a:ext cx="2264914" cy="261610"/>
           </a:xfrm>
           <a:prstGeom prst="rect">
@@ -5839,7 +5839,7 @@
         </p:nvCxnSpPr>
         <p:spPr>
           <a:xfrm>
-            <a:off x="3664968" y="3646281"/>
+            <a:off x="4216112" y="3646281"/>
             <a:ext cx="2384" cy="932509"/>
           </a:xfrm>
           <a:prstGeom prst="line">
@@ -5884,7 +5884,7 @@
         </p:nvSpPr>
         <p:spPr>
           <a:xfrm>
-            <a:off x="1905282" y="5659682"/>
+            <a:off x="2456426" y="5659682"/>
             <a:ext cx="2466302" cy="542032"/>
           </a:xfrm>
           <a:prstGeom prst="roundRect">
@@ -5944,7 +5944,7 @@
         </p:nvSpPr>
         <p:spPr>
           <a:xfrm>
-            <a:off x="4567825" y="5659682"/>
+            <a:off x="5118969" y="5659682"/>
             <a:ext cx="2639408" cy="542032"/>
           </a:xfrm>
           <a:prstGeom prst="roundRect">
@@ -6018,7 +6018,7 @@
         </p:blipFill>
         <p:spPr>
           <a:xfrm>
-            <a:off x="5161214" y="5751051"/>
+            <a:off x="5712358" y="5751051"/>
             <a:ext cx="340799" cy="340799"/>
           </a:xfrm>
           <a:prstGeom prst="rect">
@@ -6040,7 +6040,7 @@
         </p:nvSpPr>
         <p:spPr>
           <a:xfrm>
-            <a:off x="5564956" y="5780284"/>
+            <a:off x="6116100" y="5780284"/>
             <a:ext cx="1496211" cy="261610"/>
           </a:xfrm>
           <a:prstGeom prst="rect">
@@ -6096,7 +6096,7 @@
         </p:blipFill>
         <p:spPr>
           <a:xfrm>
-            <a:off x="2077106" y="5727313"/>
+            <a:off x="2628250" y="5727313"/>
             <a:ext cx="289840" cy="383732"/>
           </a:xfrm>
           <a:prstGeom prst="rect">
@@ -6118,7 +6118,7 @@
         </p:nvSpPr>
         <p:spPr>
           <a:xfrm>
-            <a:off x="2427364" y="5614310"/>
+            <a:off x="2978508" y="5614310"/>
             <a:ext cx="1985734" cy="600164"/>
           </a:xfrm>
           <a:prstGeom prst="rect">
@@ -6187,7 +6187,7 @@
         </p:nvSpPr>
         <p:spPr>
           <a:xfrm>
-            <a:off x="2912114" y="781563"/>
+            <a:off x="3463258" y="781563"/>
             <a:ext cx="1091932" cy="734054"/>
           </a:xfrm>
           <a:prstGeom prst="rect">
@@ -6272,7 +6272,7 @@
         </p:blipFill>
         <p:spPr>
           <a:xfrm>
-            <a:off x="4930577" y="2230756"/>
+            <a:off x="5481721" y="2230756"/>
             <a:ext cx="417539" cy="417539"/>
           </a:xfrm>
           <a:prstGeom prst="rect">
@@ -6294,7 +6294,7 @@
         </p:nvSpPr>
         <p:spPr>
           <a:xfrm>
-            <a:off x="5349761" y="2306184"/>
+            <a:off x="5900905" y="2306184"/>
             <a:ext cx="2264914" cy="261610"/>
           </a:xfrm>
           <a:prstGeom prst="rect">
@@ -6428,7 +6428,7 @@
         </p:blipFill>
         <p:spPr>
           <a:xfrm>
-            <a:off x="7751335" y="2034589"/>
+            <a:off x="8302479" y="2034589"/>
             <a:ext cx="355472" cy="350603"/>
           </a:xfrm>
           <a:prstGeom prst="rect">
@@ -6450,7 +6450,7 @@
         </p:nvSpPr>
         <p:spPr>
           <a:xfrm>
-            <a:off x="7313763" y="2356195"/>
+            <a:off x="7864907" y="2356195"/>
             <a:ext cx="1312396" cy="261610"/>
           </a:xfrm>
           <a:prstGeom prst="rect">
@@ -6507,7 +6507,7 @@
         </p:blipFill>
         <p:spPr>
           <a:xfrm>
-            <a:off x="3027199" y="5099802"/>
+            <a:off x="3578343" y="5099802"/>
             <a:ext cx="232295" cy="232295"/>
           </a:xfrm>
           <a:prstGeom prst="rect">
@@ -6543,7 +6543,7 @@
         </p:blipFill>
         <p:spPr>
           <a:xfrm>
-            <a:off x="5768484" y="5099802"/>
+            <a:off x="6319628" y="5099802"/>
             <a:ext cx="232295" cy="232295"/>
           </a:xfrm>
           <a:prstGeom prst="rect">
@@ -6569,7 +6569,7 @@
         </p:nvCxnSpPr>
         <p:spPr>
           <a:xfrm flipH="1">
-            <a:off x="3138433" y="5332097"/>
+            <a:off x="3689577" y="5332097"/>
             <a:ext cx="4914" cy="327585"/>
           </a:xfrm>
           <a:prstGeom prst="line">
@@ -6618,7 +6618,7 @@
         </p:nvCxnSpPr>
         <p:spPr>
           <a:xfrm>
-            <a:off x="5884632" y="5332097"/>
+            <a:off x="6435776" y="5332097"/>
             <a:ext cx="2897" cy="327585"/>
           </a:xfrm>
           <a:prstGeom prst="line">
@@ -6663,7 +6663,7 @@
         </p:nvSpPr>
         <p:spPr>
           <a:xfrm>
-            <a:off x="3281944" y="5085172"/>
+            <a:off x="3833088" y="5085172"/>
             <a:ext cx="2264914" cy="261610"/>
           </a:xfrm>
           <a:prstGeom prst="rect">
@@ -6783,7 +6783,7 @@
         </p:nvSpPr>
         <p:spPr>
           <a:xfrm>
-            <a:off x="3746157" y="4436092"/>
+            <a:off x="4297301" y="4436092"/>
             <a:ext cx="2264914" cy="261610"/>
           </a:xfrm>
           <a:prstGeom prst="rect">
@@ -6911,7 +6911,7 @@
         </p:nvSpPr>
         <p:spPr>
           <a:xfrm>
-            <a:off x="2986279" y="1106576"/>
+            <a:off x="3537423" y="1106576"/>
             <a:ext cx="924469" cy="333970"/>
           </a:xfrm>
           <a:prstGeom prst="rect">
@@ -6967,7 +6967,7 @@
         </p:nvSpPr>
         <p:spPr>
           <a:xfrm>
-            <a:off x="4198386" y="916644"/>
+            <a:off x="4749530" y="916644"/>
             <a:ext cx="1726345" cy="430887"/>
           </a:xfrm>
           <a:prstGeom prst="rect">
@@ -7015,7 +7015,7 @@
         </p:nvSpPr>
         <p:spPr>
           <a:xfrm>
-            <a:off x="3440778" y="2040156"/>
+            <a:off x="3991922" y="2040156"/>
             <a:ext cx="897500" cy="267177"/>
           </a:xfrm>
           <a:prstGeom prst="rect">
@@ -7064,7 +7064,7 @@
               <p14:nvPr/>
             </p14:nvContentPartPr>
             <p14:xfrm>
-              <a:off x="3292609" y="1591244"/>
+              <a:off x="3843753" y="1591244"/>
               <a:ext cx="232560" cy="1629000"/>
             </p14:xfrm>
           </p:contentPart>
@@ -7090,8 +7090,8 @@
             </p:blipFill>
             <p:spPr>
               <a:xfrm>
-                <a:off x="3286489" y="1585124"/>
-                <a:ext cx="244800" cy="1641240"/>
+                <a:off x="3837633" y="1585125"/>
+                <a:ext cx="244800" cy="1641237"/>
               </a:xfrm>
               <a:prstGeom prst="rect">
                 <a:avLst/>
@@ -7115,7 +7115,7 @@
               <p14:nvPr/>
             </p14:nvContentPartPr>
             <p14:xfrm>
-              <a:off x="3423289" y="3151844"/>
+              <a:off x="3974433" y="3151844"/>
               <a:ext cx="173520" cy="145440"/>
             </p14:xfrm>
           </p:contentPart>
@@ -7141,7 +7141,7 @@
             </p:blipFill>
             <p:spPr>
               <a:xfrm>
-                <a:off x="3417169" y="3145724"/>
+                <a:off x="3968313" y="3145724"/>
                 <a:ext cx="185760" cy="157680"/>
               </a:xfrm>
               <a:prstGeom prst="rect">
@@ -7166,7 +7166,7 @@
               <p14:nvPr/>
             </p14:nvContentPartPr>
             <p14:xfrm>
-              <a:off x="3981649" y="1215404"/>
+              <a:off x="4532793" y="1215404"/>
               <a:ext cx="1167120" cy="932040"/>
             </p14:xfrm>
           </p:contentPart>
@@ -7192,7 +7192,7 @@
             </p:blipFill>
             <p:spPr>
               <a:xfrm>
-                <a:off x="3975529" y="1209284"/>
+                <a:off x="4526673" y="1209284"/>
                 <a:ext cx="1179360" cy="944280"/>
               </a:xfrm>
               <a:prstGeom prst="rect">
@@ -7217,7 +7217,7 @@
               <p14:nvPr/>
             </p14:nvContentPartPr>
             <p14:xfrm>
-              <a:off x="3966889" y="1183004"/>
+              <a:off x="4518033" y="1183004"/>
               <a:ext cx="136080" cy="106200"/>
             </p14:xfrm>
           </p:contentPart>
@@ -7243,8 +7243,8 @@
             </p:blipFill>
             <p:spPr>
               <a:xfrm>
-                <a:off x="3960769" y="1176884"/>
-                <a:ext cx="148320" cy="118440"/>
+                <a:off x="4511913" y="1176905"/>
+                <a:ext cx="148320" cy="118399"/>
               </a:xfrm>
               <a:prstGeom prst="rect">
                 <a:avLst/>
@@ -7268,7 +7268,7 @@
               <p14:nvPr/>
             </p14:nvContentPartPr>
             <p14:xfrm>
-              <a:off x="5624329" y="1164644"/>
+              <a:off x="6175473" y="1164644"/>
               <a:ext cx="3790800" cy="1100520"/>
             </p14:xfrm>
           </p:contentPart>
@@ -7294,7 +7294,7 @@
             </p:blipFill>
             <p:spPr>
               <a:xfrm>
-                <a:off x="5618209" y="1158524"/>
+                <a:off x="6169353" y="1158524"/>
                 <a:ext cx="3803040" cy="1112760"/>
               </a:xfrm>
               <a:prstGeom prst="rect">
@@ -7319,7 +7319,7 @@
               <p14:nvPr/>
             </p14:nvContentPartPr>
             <p14:xfrm>
-              <a:off x="5632609" y="2205044"/>
+              <a:off x="6183753" y="2205044"/>
               <a:ext cx="113760" cy="113040"/>
             </p14:xfrm>
           </p:contentPart>
@@ -7345,8 +7345,8 @@
             </p:blipFill>
             <p:spPr>
               <a:xfrm>
-                <a:off x="5626489" y="2198924"/>
-                <a:ext cx="126000" cy="125280"/>
+                <a:off x="6177652" y="2198924"/>
+                <a:ext cx="125961" cy="125280"/>
               </a:xfrm>
               <a:prstGeom prst="rect">
                 <a:avLst/>
@@ -7369,14 +7369,14 @@
         </p:nvGrpSpPr>
         <p:grpSpPr>
           <a:xfrm>
-            <a:off x="6979369" y="1392524"/>
+            <a:off x="7530513" y="1392524"/>
             <a:ext cx="2358720" cy="2164680"/>
             <a:chOff x="6979369" y="1392524"/>
             <a:chExt cx="2358720" cy="2164680"/>
           </a:xfrm>
         </p:grpSpPr>
-        <mc:AlternateContent xmlns:mc="http://schemas.openxmlformats.org/markup-compatibility/2006">
-          <mc:Choice xmlns:p14="http://schemas.microsoft.com/office/powerpoint/2010/main" Requires="p14">
+        <mc:AlternateContent xmlns:mc="http://schemas.openxmlformats.org/markup-compatibility/2006" xmlns:p14="http://schemas.microsoft.com/office/powerpoint/2010/main">
+          <mc:Choice Requires="p14">
             <p:contentPart p14:bwMode="auto" r:id="rId64">
               <p14:nvContentPartPr>
                 <p14:cNvPr id="151" name="インク 150">
@@ -7395,7 +7395,7 @@
               </p14:xfrm>
             </p:contentPart>
           </mc:Choice>
-          <mc:Fallback>
+          <mc:Fallback xmlns="">
             <p:pic>
               <p:nvPicPr>
                 <p:cNvPr id="151" name="インク 150">
@@ -7426,8 +7426,8 @@
             </p:pic>
           </mc:Fallback>
         </mc:AlternateContent>
-        <mc:AlternateContent xmlns:mc="http://schemas.openxmlformats.org/markup-compatibility/2006">
-          <mc:Choice xmlns:p14="http://schemas.microsoft.com/office/powerpoint/2010/main" Requires="p14">
+        <mc:AlternateContent xmlns:mc="http://schemas.openxmlformats.org/markup-compatibility/2006" xmlns:p14="http://schemas.microsoft.com/office/powerpoint/2010/main">
+          <mc:Choice Requires="p14">
             <p:contentPart p14:bwMode="auto" r:id="rId66">
               <p14:nvContentPartPr>
                 <p14:cNvPr id="154" name="インク 153">
@@ -7446,7 +7446,7 @@
               </p14:xfrm>
             </p:contentPart>
           </mc:Choice>
-          <mc:Fallback>
+          <mc:Fallback xmlns="">
             <p:pic>
               <p:nvPicPr>
                 <p:cNvPr id="154" name="インク 153">
@@ -7492,7 +7492,7 @@
         </p:nvSpPr>
         <p:spPr>
           <a:xfrm>
-            <a:off x="8181099" y="1482533"/>
+            <a:off x="8732243" y="1482533"/>
             <a:ext cx="1726345" cy="430887"/>
           </a:xfrm>
           <a:prstGeom prst="rect">
@@ -7540,14 +7540,14 @@
         </p:nvGrpSpPr>
         <p:grpSpPr>
           <a:xfrm>
-            <a:off x="5759329" y="1149524"/>
+            <a:off x="6310473" y="1149524"/>
             <a:ext cx="2211480" cy="2314440"/>
             <a:chOff x="5759329" y="1149524"/>
             <a:chExt cx="2211480" cy="2314440"/>
           </a:xfrm>
         </p:grpSpPr>
-        <mc:AlternateContent xmlns:mc="http://schemas.openxmlformats.org/markup-compatibility/2006">
-          <mc:Choice xmlns:p14="http://schemas.microsoft.com/office/powerpoint/2010/main" Requires="p14">
+        <mc:AlternateContent xmlns:mc="http://schemas.openxmlformats.org/markup-compatibility/2006" xmlns:p14="http://schemas.microsoft.com/office/powerpoint/2010/main">
+          <mc:Choice Requires="p14">
             <p:contentPart p14:bwMode="auto" r:id="rId68">
               <p14:nvContentPartPr>
                 <p14:cNvPr id="158" name="インク 157">
@@ -7566,7 +7566,7 @@
               </p14:xfrm>
             </p:contentPart>
           </mc:Choice>
-          <mc:Fallback>
+          <mc:Fallback xmlns="">
             <p:pic>
               <p:nvPicPr>
                 <p:cNvPr id="158" name="インク 157">
@@ -7597,8 +7597,8 @@
             </p:pic>
           </mc:Fallback>
         </mc:AlternateContent>
-        <mc:AlternateContent xmlns:mc="http://schemas.openxmlformats.org/markup-compatibility/2006">
-          <mc:Choice xmlns:p14="http://schemas.microsoft.com/office/powerpoint/2010/main" Requires="p14">
+        <mc:AlternateContent xmlns:mc="http://schemas.openxmlformats.org/markup-compatibility/2006" xmlns:p14="http://schemas.microsoft.com/office/powerpoint/2010/main">
+          <mc:Choice Requires="p14">
             <p:contentPart p14:bwMode="auto" r:id="rId70">
               <p14:nvContentPartPr>
                 <p14:cNvPr id="159" name="インク 158">
@@ -7617,7 +7617,7 @@
               </p14:xfrm>
             </p:contentPart>
           </mc:Choice>
-          <mc:Fallback>
+          <mc:Fallback xmlns="">
             <p:pic>
               <p:nvPicPr>
                 <p:cNvPr id="159" name="インク 158">
@@ -7648,8 +7648,8 @@
             </p:pic>
           </mc:Fallback>
         </mc:AlternateContent>
-        <mc:AlternateContent xmlns:mc="http://schemas.openxmlformats.org/markup-compatibility/2006">
-          <mc:Choice xmlns:p14="http://schemas.microsoft.com/office/powerpoint/2010/main" Requires="p14">
+        <mc:AlternateContent xmlns:mc="http://schemas.openxmlformats.org/markup-compatibility/2006" xmlns:p14="http://schemas.microsoft.com/office/powerpoint/2010/main">
+          <mc:Choice Requires="p14">
             <p:contentPart p14:bwMode="auto" r:id="rId72">
               <p14:nvContentPartPr>
                 <p14:cNvPr id="162" name="インク 161">
@@ -7668,7 +7668,7 @@
               </p14:xfrm>
             </p:contentPart>
           </mc:Choice>
-          <mc:Fallback>
+          <mc:Fallback xmlns="">
             <p:pic>
               <p:nvPicPr>
                 <p:cNvPr id="162" name="インク 161">
@@ -7699,8 +7699,8 @@
             </p:pic>
           </mc:Fallback>
         </mc:AlternateContent>
-        <mc:AlternateContent xmlns:mc="http://schemas.openxmlformats.org/markup-compatibility/2006">
-          <mc:Choice xmlns:p14="http://schemas.microsoft.com/office/powerpoint/2010/main" Requires="p14">
+        <mc:AlternateContent xmlns:mc="http://schemas.openxmlformats.org/markup-compatibility/2006" xmlns:p14="http://schemas.microsoft.com/office/powerpoint/2010/main">
+          <mc:Choice Requires="p14">
             <p:contentPart p14:bwMode="auto" r:id="rId74">
               <p14:nvContentPartPr>
                 <p14:cNvPr id="165" name="インク 164">
@@ -7719,7 +7719,7 @@
               </p14:xfrm>
             </p:contentPart>
           </mc:Choice>
-          <mc:Fallback>
+          <mc:Fallback xmlns="">
             <p:pic>
               <p:nvPicPr>
                 <p:cNvPr id="165" name="インク 164">
@@ -7750,8 +7750,8 @@
             </p:pic>
           </mc:Fallback>
         </mc:AlternateContent>
-        <mc:AlternateContent xmlns:mc="http://schemas.openxmlformats.org/markup-compatibility/2006">
-          <mc:Choice xmlns:p14="http://schemas.microsoft.com/office/powerpoint/2010/main" Requires="p14">
+        <mc:AlternateContent xmlns:mc="http://schemas.openxmlformats.org/markup-compatibility/2006" xmlns:p14="http://schemas.microsoft.com/office/powerpoint/2010/main">
+          <mc:Choice Requires="p14">
             <p:contentPart p14:bwMode="auto" r:id="rId76">
               <p14:nvContentPartPr>
                 <p14:cNvPr id="168" name="インク 167">
@@ -7770,7 +7770,7 @@
               </p14:xfrm>
             </p:contentPart>
           </mc:Choice>
-          <mc:Fallback>
+          <mc:Fallback xmlns="">
             <p:pic>
               <p:nvPicPr>
                 <p:cNvPr id="168" name="インク 167">
@@ -7801,8 +7801,8 @@
             </p:pic>
           </mc:Fallback>
         </mc:AlternateContent>
-        <mc:AlternateContent xmlns:mc="http://schemas.openxmlformats.org/markup-compatibility/2006">
-          <mc:Choice xmlns:p14="http://schemas.microsoft.com/office/powerpoint/2010/main" Requires="p14">
+        <mc:AlternateContent xmlns:mc="http://schemas.openxmlformats.org/markup-compatibility/2006" xmlns:p14="http://schemas.microsoft.com/office/powerpoint/2010/main">
+          <mc:Choice Requires="p14">
             <p:contentPart p14:bwMode="auto" r:id="rId78">
               <p14:nvContentPartPr>
                 <p14:cNvPr id="171" name="インク 170">
@@ -7821,7 +7821,7 @@
               </p14:xfrm>
             </p:contentPart>
           </mc:Choice>
-          <mc:Fallback>
+          <mc:Fallback xmlns="">
             <p:pic>
               <p:nvPicPr>
                 <p:cNvPr id="171" name="インク 170">
@@ -7867,7 +7867,7 @@
         </p:nvSpPr>
         <p:spPr>
           <a:xfrm>
-            <a:off x="6899814" y="1158894"/>
+            <a:off x="7450958" y="1158894"/>
             <a:ext cx="1726345" cy="430887"/>
           </a:xfrm>
           <a:prstGeom prst="rect">
@@ -7915,7 +7915,7 @@
         </p:nvSpPr>
         <p:spPr>
           <a:xfrm>
-            <a:off x="6211865" y="2588353"/>
+            <a:off x="6763009" y="2588353"/>
             <a:ext cx="1726345" cy="261610"/>
           </a:xfrm>
           <a:prstGeom prst="rect">
@@ -7942,6 +7942,142 @@
             <a:endParaRPr kumimoji="1" lang="ja-JP" altLang="en-US" sz="1100">
               <a:solidFill>
                 <a:srgbClr val="00B050"/>
+              </a:solidFill>
+              <a:latin typeface="Segoe UI" panose="020B0502040204020203" pitchFamily="34" charset="0"/>
+              <a:cs typeface="Segoe UI" panose="020B0502040204020203" pitchFamily="34" charset="0"/>
+            </a:endParaRPr>
+          </a:p>
+        </p:txBody>
+      </p:sp>
+      <p:sp>
+        <p:nvSpPr>
+          <p:cNvPr id="3" name="四角形吹き出し 2">
+            <a:extLst>
+              <a:ext uri="{FF2B5EF4-FFF2-40B4-BE49-F238E27FC236}">
+                <a16:creationId xmlns:a16="http://schemas.microsoft.com/office/drawing/2014/main" id="{87F7B299-A2C8-1141-E5C4-18CFF415A0AA}"/>
+              </a:ext>
+            </a:extLst>
+          </p:cNvPr>
+          <p:cNvSpPr/>
+          <p:nvPr/>
+        </p:nvSpPr>
+        <p:spPr>
+          <a:xfrm>
+            <a:off x="221583" y="2273137"/>
+            <a:ext cx="2466302" cy="947107"/>
+          </a:xfrm>
+          <a:prstGeom prst="wedgeRectCallout">
+            <a:avLst>
+              <a:gd name="adj1" fmla="val 70531"/>
+              <a:gd name="adj2" fmla="val 46292"/>
+            </a:avLst>
+          </a:prstGeom>
+          <a:solidFill>
+            <a:schemeClr val="bg1"/>
+          </a:solidFill>
+          <a:ln w="9525"/>
+        </p:spPr>
+        <p:style>
+          <a:lnRef idx="2">
+            <a:schemeClr val="accent1">
+              <a:shade val="15000"/>
+            </a:schemeClr>
+          </a:lnRef>
+          <a:fillRef idx="1">
+            <a:schemeClr val="accent1"/>
+          </a:fillRef>
+          <a:effectRef idx="0">
+            <a:schemeClr val="accent1"/>
+          </a:effectRef>
+          <a:fontRef idx="minor">
+            <a:schemeClr val="lt1"/>
+          </a:fontRef>
+        </p:style>
+        <p:txBody>
+          <a:bodyPr rtlCol="0" anchor="ctr"/>
+          <a:lstStyle/>
+          <a:p>
+            <a:r>
+              <a:rPr kumimoji="1" lang="en-US" altLang="ja-JP" sz="1200" dirty="0">
+                <a:solidFill>
+                  <a:schemeClr val="tx1"/>
+                </a:solidFill>
+                <a:latin typeface="Segoe UI" panose="020B0502040204020203" pitchFamily="34" charset="0"/>
+                <a:cs typeface="Segoe UI" panose="020B0502040204020203" pitchFamily="34" charset="0"/>
+              </a:rPr>
+              <a:t>This repository is using Basic SKU which does not have zone-redundancy. If you upgrade it to Premium or isolated SKU, you can have it.</a:t>
+            </a:r>
+            <a:endParaRPr kumimoji="1" lang="ja-JP" altLang="en-US" sz="1200">
+              <a:solidFill>
+                <a:schemeClr val="tx1"/>
+              </a:solidFill>
+              <a:latin typeface="Segoe UI" panose="020B0502040204020203" pitchFamily="34" charset="0"/>
+              <a:cs typeface="Segoe UI" panose="020B0502040204020203" pitchFamily="34" charset="0"/>
+            </a:endParaRPr>
+          </a:p>
+        </p:txBody>
+      </p:sp>
+      <p:sp>
+        <p:nvSpPr>
+          <p:cNvPr id="4" name="四角形吹き出し 3">
+            <a:extLst>
+              <a:ext uri="{FF2B5EF4-FFF2-40B4-BE49-F238E27FC236}">
+                <a16:creationId xmlns:a16="http://schemas.microsoft.com/office/drawing/2014/main" id="{B69296DB-C20D-476E-90D5-705FDE8E2046}"/>
+              </a:ext>
+            </a:extLst>
+          </p:cNvPr>
+          <p:cNvSpPr/>
+          <p:nvPr/>
+        </p:nvSpPr>
+        <p:spPr>
+          <a:xfrm>
+            <a:off x="47364" y="4578790"/>
+            <a:ext cx="2306255" cy="947107"/>
+          </a:xfrm>
+          <a:prstGeom prst="wedgeRectCallout">
+            <a:avLst>
+              <a:gd name="adj1" fmla="val 47168"/>
+              <a:gd name="adj2" fmla="val 71420"/>
+            </a:avLst>
+          </a:prstGeom>
+          <a:solidFill>
+            <a:schemeClr val="bg1"/>
+          </a:solidFill>
+          <a:ln w="9525"/>
+        </p:spPr>
+        <p:style>
+          <a:lnRef idx="2">
+            <a:schemeClr val="accent1">
+              <a:shade val="15000"/>
+            </a:schemeClr>
+          </a:lnRef>
+          <a:fillRef idx="1">
+            <a:schemeClr val="accent1"/>
+          </a:fillRef>
+          <a:effectRef idx="0">
+            <a:schemeClr val="accent1"/>
+          </a:effectRef>
+          <a:fontRef idx="minor">
+            <a:schemeClr val="lt1"/>
+          </a:fontRef>
+        </p:style>
+        <p:txBody>
+          <a:bodyPr rtlCol="0" anchor="ctr"/>
+          <a:lstStyle/>
+          <a:p>
+            <a:r>
+              <a:rPr kumimoji="1" lang="en-US" altLang="ja-JP" sz="1200" dirty="0">
+                <a:solidFill>
+                  <a:schemeClr val="tx1"/>
+                </a:solidFill>
+                <a:latin typeface="Segoe UI" panose="020B0502040204020203" pitchFamily="34" charset="0"/>
+                <a:cs typeface="Segoe UI" panose="020B0502040204020203" pitchFamily="34" charset="0"/>
+              </a:rPr>
+              <a:t>This repository is using Dev/Test SKU which does not have HA If you upgrade it to Production SKU, you can have it.</a:t>
+            </a:r>
+            <a:endParaRPr kumimoji="1" lang="ja-JP" altLang="en-US" sz="1200">
+              <a:solidFill>
+                <a:schemeClr val="tx1"/>
               </a:solidFill>
               <a:latin typeface="Segoe UI" panose="020B0502040204020203" pitchFamily="34" charset="0"/>
               <a:cs typeface="Segoe UI" panose="020B0502040204020203" pitchFamily="34" charset="0"/>

</xml_diff>

<commit_message>
updated architecture diagram to express API routes are proxied by SWA
</commit_message>
<xml_diff>
--- a/assets/Architecture.pptx
+++ b/assets/Architecture.pptx
@@ -156,62 +156,6 @@
           <inkml:channelProperty channel="F" name="resolution" value="0" units="1/dev"/>
         </inkml:channelProperties>
       </inkml:inkSource>
-      <inkml:timestamp xml:id="ts0" timeString="2026-02-09T05:34:08.075"/>
-    </inkml:context>
-    <inkml:brush xml:id="br0">
-      <inkml:brushProperty name="width" value="0.035" units="cm"/>
-      <inkml:brushProperty name="height" value="0.035" units="cm"/>
-      <inkml:brushProperty name="color" value="#E71224"/>
-    </inkml:brush>
-  </inkml:definitions>
-  <inkml:trace contextRef="#ctx0" brushRef="#br0">301 1 24575,'0'43'0,"-24"27"0,7-20 0,-4 3 0,-10 7 0,-3-2 0,6-13 0,-1-2 0,-4 7 0,3-3 0,4 1 0,-2-3 0,30-34 0,19-10 0,18-1 0,13 0 0,14 0 0,-25 0 0,-2 0 0,-10 0 0,0 0 0,1 0 0,-8 0 0,-9 0 0,-8 0 0,1 0 0,-4 0 0</inkml:trace>
-</inkml:ink>
-</file>
-
-<file path=ppt/ink/ink11.xml><?xml version="1.0" encoding="utf-8"?>
-<inkml:ink xmlns:inkml="http://www.w3.org/2003/InkML">
-  <inkml:definitions>
-    <inkml:context xml:id="ctx0">
-      <inkml:inkSource xml:id="inkSrc0">
-        <inkml:traceFormat>
-          <inkml:channel name="X" type="integer" min="-2.14748E9" max="2.14748E9" units="cm"/>
-          <inkml:channel name="Y" type="integer" min="-2.14748E9" max="2.14748E9" units="cm"/>
-          <inkml:channel name="F" type="integer" max="32767" units="dev"/>
-        </inkml:traceFormat>
-        <inkml:channelProperties>
-          <inkml:channelProperty channel="X" name="resolution" value="1000" units="1/cm"/>
-          <inkml:channelProperty channel="Y" name="resolution" value="1000" units="1/cm"/>
-          <inkml:channelProperty channel="F" name="resolution" value="0" units="1/dev"/>
-        </inkml:channelProperties>
-      </inkml:inkSource>
-      <inkml:timestamp xml:id="ts0" timeString="2026-02-09T05:34:38.099"/>
-    </inkml:context>
-    <inkml:brush xml:id="br0">
-      <inkml:brushProperty name="width" value="0.035" units="cm"/>
-      <inkml:brushProperty name="height" value="0.035" units="cm"/>
-      <inkml:brushProperty name="color" value="#008C3A"/>
-    </inkml:brush>
-  </inkml:definitions>
-  <inkml:trace contextRef="#ctx0" brushRef="#br0">312 0 24575,'-3'81'0,"0"-20"0,-2 3 0,0-10 0,-1 2 0,-6 19 0,-2 0 0,6-17 0,-1-4 0,-2-2 0,0-3 0,3 9 0,-2 14 0,0 0 0,-1-12 0,-1 20 0,0 2 0,-2-9 0,-2 22 0,1-12 0,-1 10 0,4-26 0,3 15 0,0 3 0,-4 0 0,7-4 0,-1-2 0,-4-15 0,8-13 0,-5-10 0,5-13 0,-3 1 0,3-7 0,0-1 0,1-6 0,2-1 0,0-6 0,0 2 0,0 2 0,0 2 0,0 3 0,-2-2 0,1-2 0,-1-6 0,1-15 0,12-31 0,-3 5 0,3-6 0,-5 27 0</inkml:trace>
-</inkml:ink>
-</file>
-
-<file path=ppt/ink/ink12.xml><?xml version="1.0" encoding="utf-8"?>
-<inkml:ink xmlns:inkml="http://www.w3.org/2003/InkML">
-  <inkml:definitions>
-    <inkml:context xml:id="ctx0">
-      <inkml:inkSource xml:id="inkSrc0">
-        <inkml:traceFormat>
-          <inkml:channel name="X" type="integer" min="-2.14748E9" max="2.14748E9" units="cm"/>
-          <inkml:channel name="Y" type="integer" min="-2.14748E9" max="2.14748E9" units="cm"/>
-          <inkml:channel name="F" type="integer" max="32767" units="dev"/>
-        </inkml:traceFormat>
-        <inkml:channelProperties>
-          <inkml:channelProperty channel="X" name="resolution" value="1000" units="1/cm"/>
-          <inkml:channelProperty channel="Y" name="resolution" value="1000" units="1/cm"/>
-          <inkml:channelProperty channel="F" name="resolution" value="0" units="1/dev"/>
-        </inkml:channelProperties>
-      </inkml:inkSource>
       <inkml:timestamp xml:id="ts0" timeString="2026-02-09T05:34:39.896"/>
     </inkml:context>
     <inkml:brush xml:id="br0">
@@ -224,7 +168,7 @@
 </inkml:ink>
 </file>
 
-<file path=ppt/ink/ink13.xml><?xml version="1.0" encoding="utf-8"?>
+<file path=ppt/ink/ink11.xml><?xml version="1.0" encoding="utf-8"?>
 <inkml:ink xmlns:inkml="http://www.w3.org/2003/InkML">
   <inkml:definitions>
     <inkml:context xml:id="ctx0">
@@ -252,7 +196,7 @@
 </inkml:ink>
 </file>
 
-<file path=ppt/ink/ink14.xml><?xml version="1.0" encoding="utf-8"?>
+<file path=ppt/ink/ink12.xml><?xml version="1.0" encoding="utf-8"?>
 <inkml:ink xmlns:inkml="http://www.w3.org/2003/InkML">
   <inkml:definitions>
     <inkml:context xml:id="ctx0">
@@ -280,7 +224,7 @@
 </inkml:ink>
 </file>
 
-<file path=ppt/ink/ink15.xml><?xml version="1.0" encoding="utf-8"?>
+<file path=ppt/ink/ink13.xml><?xml version="1.0" encoding="utf-8"?>
 <inkml:ink xmlns:inkml="http://www.w3.org/2003/InkML">
   <inkml:definitions>
     <inkml:context xml:id="ctx0">
@@ -308,7 +252,7 @@
 </inkml:ink>
 </file>
 
-<file path=ppt/ink/ink16.xml><?xml version="1.0" encoding="utf-8"?>
+<file path=ppt/ink/ink14.xml><?xml version="1.0" encoding="utf-8"?>
 <inkml:ink xmlns:inkml="http://www.w3.org/2003/InkML">
   <inkml:definitions>
     <inkml:context xml:id="ctx0">
@@ -336,7 +280,7 @@
 </inkml:ink>
 </file>
 
-<file path=ppt/ink/ink17.xml><?xml version="1.0" encoding="utf-8"?>
+<file path=ppt/ink/ink15.xml><?xml version="1.0" encoding="utf-8"?>
 <inkml:ink xmlns:inkml="http://www.w3.org/2003/InkML">
   <inkml:definitions>
     <inkml:context xml:id="ctx0">
@@ -364,7 +308,7 @@
 </inkml:ink>
 </file>
 
-<file path=ppt/ink/ink18.xml><?xml version="1.0" encoding="utf-8"?>
+<file path=ppt/ink/ink16.xml><?xml version="1.0" encoding="utf-8"?>
 <inkml:ink xmlns:inkml="http://www.w3.org/2003/InkML">
   <inkml:definitions>
     <inkml:context xml:id="ctx0">
@@ -392,7 +336,7 @@
 </inkml:ink>
 </file>
 
-<file path=ppt/ink/ink19.xml><?xml version="1.0" encoding="utf-8"?>
+<file path=ppt/ink/ink17.xml><?xml version="1.0" encoding="utf-8"?>
 <inkml:ink xmlns:inkml="http://www.w3.org/2003/InkML">
   <inkml:definitions>
     <inkml:context xml:id="ctx0">
@@ -417,6 +361,62 @@
     </inkml:brush>
   </inkml:definitions>
   <inkml:trace contextRef="#ctx0" brushRef="#br0">3448 0 24575,'0'35'0,"-2"52"0,-2 11 0,-3 0 0,4-29 0,-2 8 0,0-7 0,-4-13 0,0-4 0,4 5 0,0 3 0,-8 33 0,2 4 0,8-13 0,1-1 0,-8 15 0,-1-2 0,5-23 0,0-3 0,-3-5 0,-1-1 0,0-4 0,0 1 0,0 3 0,1-1 0,1-12 0,0 0 0,-2 14 0,2 0 0,-6 31 0,6-43 0,0-2 0,-3 18 0,-1-1 0,0 3 0,2-14 0,-2 5 0,-1-6 0,2-13 0,1-6 0,0-13 0,-11 17 0,-1-1 0,-14 22 0,11-14 0,-16 8 0,9 7 0,-19 9 0,6 2 0,-2 0 0,-5 11 0,14-21 0,1 6 0,7-22 0,11-11 0,-10 1 0,2-7 0,-11 8 0,0-3 0,-1 2 0,-20 11 0,10-7 0,-1-1 0,-11 5 0,-16 0 0,10-6 0,5-11 0,16-8 0,-39 10 0,33-10 0,-2-1 0,-4 0 0,-4 0 0,-12 9 0,2-2 0,-16-1 0,37-11 0,0 1 0,-32 11 0,-6 4 0,39-10 0,1 0 0,-29 12 0,-11 9 0,40-21 0,-14 6 0,17-7 0,-15 6 0,-3 0 0,-2-2 0,-22 8 0,30-4 0,-13 9 0,39-15 0,0 0 0,11-9 0,-8 3 0,1-1 0,-2 3 0,0-2 0,3 1 0,-1 0 0,9-6 0,2-1 0,10-5 0,2-1 0,2 1 0,1 1 0,2 12 0,-4-3 0,3 13 0,-3-6 0,3 0 0,1 1 0,0-4 0,0-3 0,0 2 0,0 2 0,0 1 0,0 2 0,0-5 0,0-6 0,0-3 0,0-1 0,0-5 0,0-2 0</inkml:trace>
+</inkml:ink>
+</file>
+
+<file path=ppt/ink/ink18.xml><?xml version="1.0" encoding="utf-8"?>
+<inkml:ink xmlns:inkml="http://www.w3.org/2003/InkML">
+  <inkml:definitions>
+    <inkml:context xml:id="ctx0">
+      <inkml:inkSource xml:id="inkSrc0">
+        <inkml:traceFormat>
+          <inkml:channel name="X" type="integer" min="-2.14748E9" max="2.14748E9" units="cm"/>
+          <inkml:channel name="Y" type="integer" min="-2.14748E9" max="2.14748E9" units="cm"/>
+          <inkml:channel name="F" type="integer" max="32767" units="dev"/>
+        </inkml:traceFormat>
+        <inkml:channelProperties>
+          <inkml:channelProperty channel="X" name="resolution" value="1000" units="1/cm"/>
+          <inkml:channelProperty channel="Y" name="resolution" value="1000" units="1/cm"/>
+          <inkml:channelProperty channel="F" name="resolution" value="0" units="1/dev"/>
+        </inkml:channelProperties>
+      </inkml:inkSource>
+      <inkml:timestamp xml:id="ts0" timeString="2026-02-09T05:53:47.372"/>
+    </inkml:context>
+    <inkml:brush xml:id="br0">
+      <inkml:brushProperty name="width" value="0.035" units="cm"/>
+      <inkml:brushProperty name="height" value="0.035" units="cm"/>
+      <inkml:brushProperty name="color" value="#E71224"/>
+    </inkml:brush>
+  </inkml:definitions>
+  <inkml:trace contextRef="#ctx0" brushRef="#br0">0 1 24575,'0'47'0,"0"-3"0,3 2 0,1-3 0,1-9 0,7-1 0,-8-24 0,3 5 0,-4-10 0,-1 2 0,3 1 0,-2-2 0,0-1 0,3-3 0,-2-1 0,14-4 0,26-1 0,-7-3 0,23 2 0,-23-1 0,-5 2 0,-8-3 0,-12 3 0,-4 1 0,-1 2 0,-4 2 0,2 0 0</inkml:trace>
+</inkml:ink>
+</file>
+
+<file path=ppt/ink/ink19.xml><?xml version="1.0" encoding="utf-8"?>
+<inkml:ink xmlns:inkml="http://www.w3.org/2003/InkML">
+  <inkml:definitions>
+    <inkml:context xml:id="ctx0">
+      <inkml:inkSource xml:id="inkSrc0">
+        <inkml:traceFormat>
+          <inkml:channel name="X" type="integer" min="-2.14748E9" max="2.14748E9" units="cm"/>
+          <inkml:channel name="Y" type="integer" min="-2.14748E9" max="2.14748E9" units="cm"/>
+          <inkml:channel name="F" type="integer" max="32767" units="dev"/>
+        </inkml:traceFormat>
+        <inkml:channelProperties>
+          <inkml:channelProperty channel="X" name="resolution" value="1000" units="1/cm"/>
+          <inkml:channelProperty channel="Y" name="resolution" value="1000" units="1/cm"/>
+          <inkml:channelProperty channel="F" name="resolution" value="0" units="1/dev"/>
+        </inkml:channelProperties>
+      </inkml:inkSource>
+      <inkml:timestamp xml:id="ts0" timeString="2026-02-17T01:43:21.868"/>
+    </inkml:context>
+    <inkml:brush xml:id="br0">
+      <inkml:brushProperty name="width" value="0.035" units="cm"/>
+      <inkml:brushProperty name="height" value="0.035" units="cm"/>
+      <inkml:brushProperty name="color" value="#E71224"/>
+    </inkml:brush>
+  </inkml:definitions>
+  <inkml:trace contextRef="#ctx0" brushRef="#br0">934 1 24575,'84'0'0,"-6"4"0,-19 6 0,4 6 0,13 17 0,-3 7 0,-24-6 0,-1 3 0,27 16 0,4 4 0,-5 3 0,-1-2 0,-6-11 0,4 1 0,5 4 0,7 5 0,-5-6 0,-2-3 0,-1-2 0,-13-9 0,1 1 0,-4-2 0,1 2 0,-4-3 0,-8-5 0,-3 0 0,32 25 0,-5 2 0,-15-6 0,-14-11 0,-1 0 0,18 14 0,-7 0 0,1 2 0,12 6 0,-14-4 0,0 1 0,12 16 0,-7-7 0,-20-7 0,-22-33 0,6 29 0,-8-17 0,2 26 0,-3-7 0,2 4 0,-5-5 0,-4-11 0,-3-16 0,-2 10 0,2-14 0,0 6 0,-2 18 0,1-31 0,-1 21 0,0-26 0,0 14 0,-7-1 0,-8 10 0,-12-2 0,-12 7 0,-14 2 0,0-1 0,14-15 0,-43 22 0,22-24 0,-9 8 0,-9 4 0,-4-7 0,-5 0 0,10-3 0,-4 3 0,-3 0 0,12-4 0,-2 0 0,-1 1 0,1-1 0,3 0 0,1 0 0,-1 0 0,0 1 0,-4 1 0,-1 0 0,2 1 0,4-2 0,0 2 0,5-2 0,0 0 0,1-1 0,2-1 0,3-1 0,-5 4 0,4-3 0,14-5 0,2-2 0,-5 0 0,2-1 0,-27 14 0,-16 6 0,43-17 0,0 2 0,-3 0 0,1 1 0,5-1 0,0 0 0,-40 22 0,16-3 0,2 1 0,12-10 0,-15 12 0,28-24 0,-15 1 0,20-5 0,3-8 0,11 8 0,10-2 0,0-2 0,-8 7 0,-2 0 0,-2-1 0,13-3 0,6-8 0,5-5 0,0 0 0,0-3 0</inkml:trace>
 </inkml:ink>
 </file>
 
@@ -464,7 +464,7 @@
           <inkml:channelProperty channel="F" name="resolution" value="0" units="1/dev"/>
         </inkml:channelProperties>
       </inkml:inkSource>
-      <inkml:timestamp xml:id="ts0" timeString="2026-02-09T05:53:47.372"/>
+      <inkml:timestamp xml:id="ts0" timeString="2026-02-17T01:43:23.549"/>
     </inkml:context>
     <inkml:brush xml:id="br0">
       <inkml:brushProperty name="width" value="0.035" units="cm"/>
@@ -472,67 +472,11 @@
       <inkml:brushProperty name="color" value="#E71224"/>
     </inkml:brush>
   </inkml:definitions>
-  <inkml:trace contextRef="#ctx0" brushRef="#br0">0 1 24575,'0'47'0,"0"-3"0,3 2 0,1-3 0,1-9 0,7-1 0,-8-24 0,3 5 0,-4-10 0,-1 2 0,3 1 0,-2-2 0,0-1 0,3-3 0,-2-1 0,14-4 0,26-1 0,-7-3 0,23 2 0,-23-1 0,-5 2 0,-8-3 0,-12 3 0,-4 1 0,-1 2 0,-4 2 0,2 0 0</inkml:trace>
+  <inkml:trace contextRef="#ctx0" brushRef="#br0">0 1 24575,'0'58'0,"0"1"0,0 18 0,0-8 0,0-4 0,0-10 0,0-25 0,0-2 0,0-10 0,0 4 0,0 5 0,0-18 0,0 15 0,0-17 0,0 0 0,3-2 0,-2-4 0,6-1 0,-4 0 0,4 0 0,-4-2 0,7 0 0,18-18 0,39-11 0,2-5 0,11-1 0,-31 15 0,-22 10 0,-5 2 0,-13 9 0,-2-1 0,-4 1 0,-2 1 0</inkml:trace>
 </inkml:ink>
 </file>
 
 <file path=ppt/ink/ink3.xml><?xml version="1.0" encoding="utf-8"?>
-<inkml:ink xmlns:inkml="http://www.w3.org/2003/InkML">
-  <inkml:definitions>
-    <inkml:context xml:id="ctx0">
-      <inkml:inkSource xml:id="inkSrc0">
-        <inkml:traceFormat>
-          <inkml:channel name="X" type="integer" min="-2.14748E9" max="2.14748E9" units="cm"/>
-          <inkml:channel name="Y" type="integer" min="-2.14748E9" max="2.14748E9" units="cm"/>
-          <inkml:channel name="F" type="integer" max="32767" units="dev"/>
-        </inkml:traceFormat>
-        <inkml:channelProperties>
-          <inkml:channelProperty channel="X" name="resolution" value="1000" units="1/cm"/>
-          <inkml:channelProperty channel="Y" name="resolution" value="1000" units="1/cm"/>
-          <inkml:channelProperty channel="F" name="resolution" value="0" units="1/dev"/>
-        </inkml:channelProperties>
-      </inkml:inkSource>
-      <inkml:timestamp xml:id="ts0" timeString="2026-02-09T05:33:32.167"/>
-    </inkml:context>
-    <inkml:brush xml:id="br0">
-      <inkml:brushProperty name="width" value="0.035" units="cm"/>
-      <inkml:brushProperty name="height" value="0.035" units="cm"/>
-      <inkml:brushProperty name="color" value="#E71224"/>
-    </inkml:brush>
-  </inkml:definitions>
-  <inkml:trace contextRef="#ctx0" brushRef="#br0">1 0 24575,'0'58'0,"8"-7"0,4 6 0,1 21 0,2 5 0,13 6 0,1 2 0,-14-20 0,-2 1 0,2-3 0,6 10 0,0 3-256,-7-2 1,-2 6 0,-1-3 255,-1 8 0,0 1 0,0-13 0,0 4 0,-2-6 0,-1 2 0,-2-1 0,1-5 0,1 4 0,0-3 0,2 17 0,1 0 0,-3-22 0,1 2 0,1 1 18,0 7 1,0 1 0,0-6-19,1 0 0,-1-4 0,3 10 0,-1-1 0,-1-16 0,0-2 0,1 4 0,-1 0 0,0-6 0,1 1 286,2 14 1,-1-6-287,-3 0 137,4 5-137,-7 12 0,0-47 0,-1 32 0,2 1 0,1-26 0,-1 46 0,-2-56 0,-3-19 0,1 8 0,3 1 0,-1-6 0,-1 5 0,-3-9 0,12 31 0,-8-17 0,14 34 0,-13-23 0,1-8 0,-5 0 0,-2-16 0,0 5 0,0-3 0,0 3 0,0-9 0,0 0 0,0-4 0,0 3 0,0-3 0,0 1 0,0-2 0,0 3 0,0 0 0,0-1 0,0-3 0,0 1 0,0-3 0,0 1 0,0 1 0,0-3 0,0 0 0,0-2 0</inkml:trace>
-</inkml:ink>
-</file>
-
-<file path=ppt/ink/ink4.xml><?xml version="1.0" encoding="utf-8"?>
-<inkml:ink xmlns:inkml="http://www.w3.org/2003/InkML">
-  <inkml:definitions>
-    <inkml:context xml:id="ctx0">
-      <inkml:inkSource xml:id="inkSrc0">
-        <inkml:traceFormat>
-          <inkml:channel name="X" type="integer" min="-2.14748E9" max="2.14748E9" units="cm"/>
-          <inkml:channel name="Y" type="integer" min="-2.14748E9" max="2.14748E9" units="cm"/>
-          <inkml:channel name="F" type="integer" max="32767" units="dev"/>
-        </inkml:traceFormat>
-        <inkml:channelProperties>
-          <inkml:channelProperty channel="X" name="resolution" value="1000" units="1/cm"/>
-          <inkml:channelProperty channel="Y" name="resolution" value="1000" units="1/cm"/>
-          <inkml:channelProperty channel="F" name="resolution" value="0" units="1/dev"/>
-        </inkml:channelProperties>
-      </inkml:inkSource>
-      <inkml:timestamp xml:id="ts0" timeString="2026-02-09T05:33:34.552"/>
-    </inkml:context>
-    <inkml:brush xml:id="br0">
-      <inkml:brushProperty name="width" value="0.035" units="cm"/>
-      <inkml:brushProperty name="height" value="0.035" units="cm"/>
-      <inkml:brushProperty name="color" value="#E71224"/>
-    </inkml:brush>
-  </inkml:definitions>
-  <inkml:trace contextRef="#ctx0" brushRef="#br0">1 0 24575,'0'25'0,"9"11"0,14 19 0,23 19 0,-5-22 0,12 10 0,-28-34 0,0-3 0,-12-10 0,-4-9 0,4 1 0,-3-3 0,4 4 0,-6-6 0,0 2 0,1-9 0,20-29 0,-9 8 0,22-37 0,-15 28 0,-7 0 0,-1 12 0,-12 15 0,-1 1 0,-3 5 0,-1 2 0</inkml:trace>
-</inkml:ink>
-</file>
-
-<file path=ppt/ink/ink5.xml><?xml version="1.0" encoding="utf-8"?>
 <inkml:ink xmlns:inkml="http://www.w3.org/2003/InkML">
   <inkml:definitions>
     <inkml:context xml:id="ctx0">
@@ -560,7 +504,7 @@
 </inkml:ink>
 </file>
 
-<file path=ppt/ink/ink6.xml><?xml version="1.0" encoding="utf-8"?>
+<file path=ppt/ink/ink4.xml><?xml version="1.0" encoding="utf-8"?>
 <inkml:ink xmlns:inkml="http://www.w3.org/2003/InkML">
   <inkml:definitions>
     <inkml:context xml:id="ctx0">
@@ -588,7 +532,7 @@
 </inkml:ink>
 </file>
 
-<file path=ppt/ink/ink7.xml><?xml version="1.0" encoding="utf-8"?>
+<file path=ppt/ink/ink5.xml><?xml version="1.0" encoding="utf-8"?>
 <inkml:ink xmlns:inkml="http://www.w3.org/2003/InkML">
   <inkml:definitions>
     <inkml:context xml:id="ctx0">
@@ -616,7 +560,7 @@
 </inkml:ink>
 </file>
 
-<file path=ppt/ink/ink8.xml><?xml version="1.0" encoding="utf-8"?>
+<file path=ppt/ink/ink6.xml><?xml version="1.0" encoding="utf-8"?>
 <inkml:ink xmlns:inkml="http://www.w3.org/2003/InkML">
   <inkml:definitions>
     <inkml:context xml:id="ctx0">
@@ -644,7 +588,7 @@
 </inkml:ink>
 </file>
 
-<file path=ppt/ink/ink9.xml><?xml version="1.0" encoding="utf-8"?>
+<file path=ppt/ink/ink7.xml><?xml version="1.0" encoding="utf-8"?>
 <inkml:ink xmlns:inkml="http://www.w3.org/2003/InkML">
   <inkml:definitions>
     <inkml:context xml:id="ctx0">
@@ -669,6 +613,62 @@
     </inkml:brush>
   </inkml:definitions>
   <inkml:trace contextRef="#ctx0" brushRef="#br0">6552 0 24575,'0'42'0,"-3"-3"0,0 40 0,-4-22 0,-2 1 0,3-8 0,-1 0 0,-6 11 0,0 1 0,0-10 0,0-4 0,-10 22 0,-2 9 0,8-10 0,2-12 0,0 2 0,-4 29 0,3-27 0,-1 0 0,-10 27 0,0-17 0,9-19 0,-2 3 0,1-11 0,-2 4 0,-6 19 0,-4 11 0,1-4 0,-7 16 0,0 1 0,4-13 0,-2 4 0,2-1 0,3-5 0,0 0 0,2-7 0,-4 1 0,0-2 0,-11 21 0,0-4 0,13-33 0,-2-4 0,-10 12 0,-2 1 0,-1-2 0,-2 2 0,-8 16 0,-7 3 0,7-16 0,-5 1 0,1 0 0,7-5 0,1-1 0,0-2 0,0-2 0,-1-2 0,2-3 0,-14 11 0,4-6 0,14-15 0,0 1 0,-19 14 0,-5 4 0,0-1 0,-6 4 0,2-3 0,-6 4 0,4-5 0,16-14 0,3-4 0,-2 2 0,-13 9 0,-4 1 0,7-6 0,3-4 0,2-4 0,-11 8 0,-3 0 0,3-5 0,-4 0 0,12-6 0,-5 1 0,-3 1 0,6-5 0,-5 1 0,0-1 0,1-1 0,-14 5 0,1-2 0,-1 0-205,17-6 0,-3 1 0,2 0 0,3-3 205,-5 2 0,4-2 0,0-2 0,1-4 0,0-2 0,0 1 0,-4 5 0,0 1 0,-3-1 0,-11 0 0,-2-2 0,0 1 0,6 1 0,2 1 0,-1-1 0,3-3 0,1 0 0,2 0-8,-23 9 0,5-3 8,14-9 0,2-2 0,-1 3 0,2-2 0,12-5 0,4-2 0,-38 7 0,32-9 819,32-5-819,8-3 17,12 0-17,8 0 0,2-4 0,3-6 0,1 3 0,0-2 0</inkml:trace>
+</inkml:ink>
+</file>
+
+<file path=ppt/ink/ink8.xml><?xml version="1.0" encoding="utf-8"?>
+<inkml:ink xmlns:inkml="http://www.w3.org/2003/InkML">
+  <inkml:definitions>
+    <inkml:context xml:id="ctx0">
+      <inkml:inkSource xml:id="inkSrc0">
+        <inkml:traceFormat>
+          <inkml:channel name="X" type="integer" min="-2.14748E9" max="2.14748E9" units="cm"/>
+          <inkml:channel name="Y" type="integer" min="-2.14748E9" max="2.14748E9" units="cm"/>
+          <inkml:channel name="F" type="integer" max="32767" units="dev"/>
+        </inkml:traceFormat>
+        <inkml:channelProperties>
+          <inkml:channelProperty channel="X" name="resolution" value="1000" units="1/cm"/>
+          <inkml:channelProperty channel="Y" name="resolution" value="1000" units="1/cm"/>
+          <inkml:channelProperty channel="F" name="resolution" value="0" units="1/dev"/>
+        </inkml:channelProperties>
+      </inkml:inkSource>
+      <inkml:timestamp xml:id="ts0" timeString="2026-02-09T05:34:08.075"/>
+    </inkml:context>
+    <inkml:brush xml:id="br0">
+      <inkml:brushProperty name="width" value="0.035" units="cm"/>
+      <inkml:brushProperty name="height" value="0.035" units="cm"/>
+      <inkml:brushProperty name="color" value="#E71224"/>
+    </inkml:brush>
+  </inkml:definitions>
+  <inkml:trace contextRef="#ctx0" brushRef="#br0">301 1 24575,'0'43'0,"-24"27"0,7-20 0,-4 3 0,-10 7 0,-3-2 0,6-13 0,-1-2 0,-4 7 0,3-3 0,4 1 0,-2-3 0,30-34 0,19-10 0,18-1 0,13 0 0,14 0 0,-25 0 0,-2 0 0,-10 0 0,0 0 0,1 0 0,-8 0 0,-9 0 0,-8 0 0,1 0 0,-4 0 0</inkml:trace>
+</inkml:ink>
+</file>
+
+<file path=ppt/ink/ink9.xml><?xml version="1.0" encoding="utf-8"?>
+<inkml:ink xmlns:inkml="http://www.w3.org/2003/InkML">
+  <inkml:definitions>
+    <inkml:context xml:id="ctx0">
+      <inkml:inkSource xml:id="inkSrc0">
+        <inkml:traceFormat>
+          <inkml:channel name="X" type="integer" min="-2.14748E9" max="2.14748E9" units="cm"/>
+          <inkml:channel name="Y" type="integer" min="-2.14748E9" max="2.14748E9" units="cm"/>
+          <inkml:channel name="F" type="integer" max="32767" units="dev"/>
+        </inkml:traceFormat>
+        <inkml:channelProperties>
+          <inkml:channelProperty channel="X" name="resolution" value="1000" units="1/cm"/>
+          <inkml:channelProperty channel="Y" name="resolution" value="1000" units="1/cm"/>
+          <inkml:channelProperty channel="F" name="resolution" value="0" units="1/dev"/>
+        </inkml:channelProperties>
+      </inkml:inkSource>
+      <inkml:timestamp xml:id="ts0" timeString="2026-02-09T05:34:38.099"/>
+    </inkml:context>
+    <inkml:brush xml:id="br0">
+      <inkml:brushProperty name="width" value="0.035" units="cm"/>
+      <inkml:brushProperty name="height" value="0.035" units="cm"/>
+      <inkml:brushProperty name="color" value="#008C3A"/>
+    </inkml:brush>
+  </inkml:definitions>
+  <inkml:trace contextRef="#ctx0" brushRef="#br0">312 0 24575,'-3'81'0,"0"-20"0,-2 3 0,0-10 0,-1 2 0,-6 19 0,-2 0 0,6-17 0,-1-4 0,-2-2 0,0-3 0,3 9 0,-2 14 0,0 0 0,-1-12 0,-1 20 0,0 2 0,-2-9 0,-2 22 0,1-12 0,-1 10 0,4-26 0,3 15 0,0 3 0,-4 0 0,7-4 0,-1-2 0,-4-15 0,8-13 0,-5-10 0,5-13 0,-3 1 0,3-7 0,0-1 0,1-6 0,2-1 0,0-6 0,0 2 0,0 2 0,0 2 0,0 3 0,-2-2 0,1-2 0,-1-6 0,1-15 0,12-31 0,-3 5 0,3-6 0,-5 27 0</inkml:trace>
 </inkml:ink>
 </file>
 
@@ -819,7 +819,7 @@
           <a:p>
             <a:fld id="{F0CB0818-5DF7-A940-86F4-FFB7C80D4BAA}" type="datetimeFigureOut">
               <a:rPr kumimoji="1" lang="ja-JP" altLang="en-US" smtClean="0"/>
-              <a:t>2026/2/9</a:t>
+              <a:t>2026/2/17</a:t>
             </a:fld>
             <a:endParaRPr kumimoji="1" lang="ja-JP" altLang="en-US"/>
           </a:p>
@@ -1049,7 +1049,7 @@
           <a:p>
             <a:fld id="{F0CB0818-5DF7-A940-86F4-FFB7C80D4BAA}" type="datetimeFigureOut">
               <a:rPr kumimoji="1" lang="ja-JP" altLang="en-US" smtClean="0"/>
-              <a:t>2026/2/9</a:t>
+              <a:t>2026/2/17</a:t>
             </a:fld>
             <a:endParaRPr kumimoji="1" lang="ja-JP" altLang="en-US"/>
           </a:p>
@@ -1289,7 +1289,7 @@
           <a:p>
             <a:fld id="{F0CB0818-5DF7-A940-86F4-FFB7C80D4BAA}" type="datetimeFigureOut">
               <a:rPr kumimoji="1" lang="ja-JP" altLang="en-US" smtClean="0"/>
-              <a:t>2026/2/9</a:t>
+              <a:t>2026/2/17</a:t>
             </a:fld>
             <a:endParaRPr kumimoji="1" lang="ja-JP" altLang="en-US"/>
           </a:p>
@@ -1519,7 +1519,7 @@
           <a:p>
             <a:fld id="{F0CB0818-5DF7-A940-86F4-FFB7C80D4BAA}" type="datetimeFigureOut">
               <a:rPr kumimoji="1" lang="ja-JP" altLang="en-US" smtClean="0"/>
-              <a:t>2026/2/9</a:t>
+              <a:t>2026/2/17</a:t>
             </a:fld>
             <a:endParaRPr kumimoji="1" lang="ja-JP" altLang="en-US"/>
           </a:p>
@@ -1794,7 +1794,7 @@
           <a:p>
             <a:fld id="{F0CB0818-5DF7-A940-86F4-FFB7C80D4BAA}" type="datetimeFigureOut">
               <a:rPr kumimoji="1" lang="ja-JP" altLang="en-US" smtClean="0"/>
-              <a:t>2026/2/9</a:t>
+              <a:t>2026/2/17</a:t>
             </a:fld>
             <a:endParaRPr kumimoji="1" lang="ja-JP" altLang="en-US"/>
           </a:p>
@@ -2123,7 +2123,7 @@
           <a:p>
             <a:fld id="{F0CB0818-5DF7-A940-86F4-FFB7C80D4BAA}" type="datetimeFigureOut">
               <a:rPr kumimoji="1" lang="ja-JP" altLang="en-US" smtClean="0"/>
-              <a:t>2026/2/9</a:t>
+              <a:t>2026/2/17</a:t>
             </a:fld>
             <a:endParaRPr kumimoji="1" lang="ja-JP" altLang="en-US"/>
           </a:p>
@@ -2599,7 +2599,7 @@
           <a:p>
             <a:fld id="{F0CB0818-5DF7-A940-86F4-FFB7C80D4BAA}" type="datetimeFigureOut">
               <a:rPr kumimoji="1" lang="ja-JP" altLang="en-US" smtClean="0"/>
-              <a:t>2026/2/9</a:t>
+              <a:t>2026/2/17</a:t>
             </a:fld>
             <a:endParaRPr kumimoji="1" lang="ja-JP" altLang="en-US"/>
           </a:p>
@@ -2740,7 +2740,7 @@
           <a:p>
             <a:fld id="{F0CB0818-5DF7-A940-86F4-FFB7C80D4BAA}" type="datetimeFigureOut">
               <a:rPr kumimoji="1" lang="ja-JP" altLang="en-US" smtClean="0"/>
-              <a:t>2026/2/9</a:t>
+              <a:t>2026/2/17</a:t>
             </a:fld>
             <a:endParaRPr kumimoji="1" lang="ja-JP" altLang="en-US"/>
           </a:p>
@@ -2853,7 +2853,7 @@
           <a:p>
             <a:fld id="{F0CB0818-5DF7-A940-86F4-FFB7C80D4BAA}" type="datetimeFigureOut">
               <a:rPr kumimoji="1" lang="ja-JP" altLang="en-US" smtClean="0"/>
-              <a:t>2026/2/9</a:t>
+              <a:t>2026/2/17</a:t>
             </a:fld>
             <a:endParaRPr kumimoji="1" lang="ja-JP" altLang="en-US"/>
           </a:p>
@@ -3196,7 +3196,7 @@
           <a:p>
             <a:fld id="{F0CB0818-5DF7-A940-86F4-FFB7C80D4BAA}" type="datetimeFigureOut">
               <a:rPr kumimoji="1" lang="ja-JP" altLang="en-US" smtClean="0"/>
-              <a:t>2026/2/9</a:t>
+              <a:t>2026/2/17</a:t>
             </a:fld>
             <a:endParaRPr kumimoji="1" lang="ja-JP" altLang="en-US"/>
           </a:p>
@@ -3484,7 +3484,7 @@
           <a:p>
             <a:fld id="{F0CB0818-5DF7-A940-86F4-FFB7C80D4BAA}" type="datetimeFigureOut">
               <a:rPr kumimoji="1" lang="ja-JP" altLang="en-US" smtClean="0"/>
-              <a:t>2026/2/9</a:t>
+              <a:t>2026/2/17</a:t>
             </a:fld>
             <a:endParaRPr kumimoji="1" lang="ja-JP" altLang="en-US"/>
           </a:p>
@@ -3757,7 +3757,7 @@
           <a:p>
             <a:fld id="{F0CB0818-5DF7-A940-86F4-FFB7C80D4BAA}" type="datetimeFigureOut">
               <a:rPr kumimoji="1" lang="ja-JP" altLang="en-US" smtClean="0"/>
-              <a:t>2026/2/9</a:t>
+              <a:t>2026/2/17</a:t>
             </a:fld>
             <a:endParaRPr kumimoji="1" lang="ja-JP" altLang="en-US"/>
           </a:p>
@@ -7127,7 +7127,7 @@
         </p:nvSpPr>
         <p:spPr>
           <a:xfrm>
-            <a:off x="3991922" y="2040156"/>
+            <a:off x="4710087" y="2050988"/>
             <a:ext cx="897500" cy="267177"/>
           </a:xfrm>
           <a:prstGeom prst="rect">
@@ -7164,108 +7164,6 @@
       <mc:AlternateContent xmlns:mc="http://schemas.openxmlformats.org/markup-compatibility/2006" xmlns:p14="http://schemas.microsoft.com/office/powerpoint/2010/main">
         <mc:Choice Requires="p14">
           <p:contentPart p14:bwMode="auto" r:id="rId52">
-            <p14:nvContentPartPr>
-              <p14:cNvPr id="138" name="インク 137">
-                <a:extLst>
-                  <a:ext uri="{FF2B5EF4-FFF2-40B4-BE49-F238E27FC236}">
-                    <a16:creationId xmlns:a16="http://schemas.microsoft.com/office/drawing/2014/main" id="{EFAC115E-736E-FA7B-F5B9-67B2F2FC9CB1}"/>
-                  </a:ext>
-                </a:extLst>
-              </p14:cNvPr>
-              <p14:cNvContentPartPr/>
-              <p14:nvPr/>
-            </p14:nvContentPartPr>
-            <p14:xfrm>
-              <a:off x="3843753" y="1591244"/>
-              <a:ext cx="232560" cy="1629000"/>
-            </p14:xfrm>
-          </p:contentPart>
-        </mc:Choice>
-        <mc:Fallback xmlns="">
-          <p:pic>
-            <p:nvPicPr>
-              <p:cNvPr id="138" name="インク 137">
-                <a:extLst>
-                  <a:ext uri="{FF2B5EF4-FFF2-40B4-BE49-F238E27FC236}">
-                    <a16:creationId xmlns:a16="http://schemas.microsoft.com/office/drawing/2014/main" id="{EFAC115E-736E-FA7B-F5B9-67B2F2FC9CB1}"/>
-                  </a:ext>
-                </a:extLst>
-              </p:cNvPr>
-              <p:cNvPicPr/>
-              <p:nvPr/>
-            </p:nvPicPr>
-            <p:blipFill>
-              <a:blip r:embed="rId53"/>
-              <a:stretch>
-                <a:fillRect/>
-              </a:stretch>
-            </p:blipFill>
-            <p:spPr>
-              <a:xfrm>
-                <a:off x="3837633" y="1585125"/>
-                <a:ext cx="244800" cy="1641237"/>
-              </a:xfrm>
-              <a:prstGeom prst="rect">
-                <a:avLst/>
-              </a:prstGeom>
-            </p:spPr>
-          </p:pic>
-        </mc:Fallback>
-      </mc:AlternateContent>
-      <mc:AlternateContent xmlns:mc="http://schemas.openxmlformats.org/markup-compatibility/2006" xmlns:p14="http://schemas.microsoft.com/office/powerpoint/2010/main">
-        <mc:Choice Requires="p14">
-          <p:contentPart p14:bwMode="auto" r:id="rId54">
-            <p14:nvContentPartPr>
-              <p14:cNvPr id="141" name="インク 140">
-                <a:extLst>
-                  <a:ext uri="{FF2B5EF4-FFF2-40B4-BE49-F238E27FC236}">
-                    <a16:creationId xmlns:a16="http://schemas.microsoft.com/office/drawing/2014/main" id="{ABA9DC1B-74F8-1791-81BB-3B353BCA252E}"/>
-                  </a:ext>
-                </a:extLst>
-              </p14:cNvPr>
-              <p14:cNvContentPartPr/>
-              <p14:nvPr/>
-            </p14:nvContentPartPr>
-            <p14:xfrm>
-              <a:off x="3974433" y="3151844"/>
-              <a:ext cx="173520" cy="145440"/>
-            </p14:xfrm>
-          </p:contentPart>
-        </mc:Choice>
-        <mc:Fallback xmlns="">
-          <p:pic>
-            <p:nvPicPr>
-              <p:cNvPr id="141" name="インク 140">
-                <a:extLst>
-                  <a:ext uri="{FF2B5EF4-FFF2-40B4-BE49-F238E27FC236}">
-                    <a16:creationId xmlns:a16="http://schemas.microsoft.com/office/drawing/2014/main" id="{ABA9DC1B-74F8-1791-81BB-3B353BCA252E}"/>
-                  </a:ext>
-                </a:extLst>
-              </p:cNvPr>
-              <p:cNvPicPr/>
-              <p:nvPr/>
-            </p:nvPicPr>
-            <p:blipFill>
-              <a:blip r:embed="rId55"/>
-              <a:stretch>
-                <a:fillRect/>
-              </a:stretch>
-            </p:blipFill>
-            <p:spPr>
-              <a:xfrm>
-                <a:off x="3968313" y="3145724"/>
-                <a:ext cx="185760" cy="157680"/>
-              </a:xfrm>
-              <a:prstGeom prst="rect">
-                <a:avLst/>
-              </a:prstGeom>
-            </p:spPr>
-          </p:pic>
-        </mc:Fallback>
-      </mc:AlternateContent>
-      <mc:AlternateContent xmlns:mc="http://schemas.openxmlformats.org/markup-compatibility/2006" xmlns:p14="http://schemas.microsoft.com/office/powerpoint/2010/main">
-        <mc:Choice Requires="p14">
-          <p:contentPart p14:bwMode="auto" r:id="rId56">
             <p14:nvContentPartPr>
               <p14:cNvPr id="133" name="インク 132">
                 <a:extLst>
@@ -8217,8 +8115,8 @@
             <a:chExt cx="1978200" cy="1933920"/>
           </a:xfrm>
         </p:grpSpPr>
-        <mc:AlternateContent xmlns:mc="http://schemas.openxmlformats.org/markup-compatibility/2006">
-          <mc:Choice xmlns:p14="http://schemas.microsoft.com/office/powerpoint/2010/main" Requires="p14">
+        <mc:AlternateContent xmlns:mc="http://schemas.openxmlformats.org/markup-compatibility/2006" xmlns:p14="http://schemas.microsoft.com/office/powerpoint/2010/main">
+          <mc:Choice Requires="p14">
             <p:contentPart p14:bwMode="auto" r:id="rId80">
               <p14:nvContentPartPr>
                 <p14:cNvPr id="9" name="インク 8">
@@ -8237,7 +8135,7 @@
               </p14:xfrm>
             </p:contentPart>
           </mc:Choice>
-          <mc:Fallback>
+          <mc:Fallback xmlns="">
             <p:pic>
               <p:nvPicPr>
                 <p:cNvPr id="9" name="インク 8">
@@ -8268,8 +8166,8 @@
             </p:pic>
           </mc:Fallback>
         </mc:AlternateContent>
-        <mc:AlternateContent xmlns:mc="http://schemas.openxmlformats.org/markup-compatibility/2006">
-          <mc:Choice xmlns:p14="http://schemas.microsoft.com/office/powerpoint/2010/main" Requires="p14">
+        <mc:AlternateContent xmlns:mc="http://schemas.openxmlformats.org/markup-compatibility/2006" xmlns:p14="http://schemas.microsoft.com/office/powerpoint/2010/main">
+          <mc:Choice Requires="p14">
             <p:contentPart p14:bwMode="auto" r:id="rId82">
               <p14:nvContentPartPr>
                 <p14:cNvPr id="10" name="インク 9">
@@ -8288,7 +8186,7 @@
               </p14:xfrm>
             </p:contentPart>
           </mc:Choice>
-          <mc:Fallback>
+          <mc:Fallback xmlns="">
             <p:pic>
               <p:nvPicPr>
                 <p:cNvPr id="10" name="インク 9">
@@ -8398,8 +8296,8 @@
             <a:chExt cx="1273320" cy="1919880"/>
           </a:xfrm>
         </p:grpSpPr>
-        <mc:AlternateContent xmlns:mc="http://schemas.openxmlformats.org/markup-compatibility/2006">
-          <mc:Choice xmlns:p14="http://schemas.microsoft.com/office/powerpoint/2010/main" Requires="p14">
+        <mc:AlternateContent xmlns:mc="http://schemas.openxmlformats.org/markup-compatibility/2006" xmlns:p14="http://schemas.microsoft.com/office/powerpoint/2010/main">
+          <mc:Choice Requires="p14">
             <p:contentPart p14:bwMode="auto" r:id="rId84">
               <p14:nvContentPartPr>
                 <p14:cNvPr id="16" name="インク 15">
@@ -8418,7 +8316,7 @@
               </p14:xfrm>
             </p:contentPart>
           </mc:Choice>
-          <mc:Fallback>
+          <mc:Fallback xmlns="">
             <p:pic>
               <p:nvPicPr>
                 <p:cNvPr id="16" name="インク 15">
@@ -8449,8 +8347,8 @@
             </p:pic>
           </mc:Fallback>
         </mc:AlternateContent>
-        <mc:AlternateContent xmlns:mc="http://schemas.openxmlformats.org/markup-compatibility/2006">
-          <mc:Choice xmlns:p14="http://schemas.microsoft.com/office/powerpoint/2010/main" Requires="p14">
+        <mc:AlternateContent xmlns:mc="http://schemas.openxmlformats.org/markup-compatibility/2006" xmlns:p14="http://schemas.microsoft.com/office/powerpoint/2010/main">
+          <mc:Choice Requires="p14">
             <p:contentPart p14:bwMode="auto" r:id="rId86">
               <p14:nvContentPartPr>
                 <p14:cNvPr id="17" name="インク 16">
@@ -8469,7 +8367,7 @@
               </p14:xfrm>
             </p:contentPart>
           </mc:Choice>
-          <mc:Fallback>
+          <mc:Fallback xmlns="">
             <p:pic>
               <p:nvPicPr>
                 <p:cNvPr id="17" name="インク 16">
@@ -8549,6 +8447,129 @@
           </a:p>
         </p:txBody>
       </p:sp>
+      <p:grpSp>
+        <p:nvGrpSpPr>
+          <p:cNvPr id="23" name="グループ化 22">
+            <a:extLst>
+              <a:ext uri="{FF2B5EF4-FFF2-40B4-BE49-F238E27FC236}">
+                <a16:creationId xmlns:a16="http://schemas.microsoft.com/office/drawing/2014/main" id="{6D3C5D74-7452-8837-2E03-5D24348EEBBE}"/>
+              </a:ext>
+            </a:extLst>
+          </p:cNvPr>
+          <p:cNvGrpSpPr/>
+          <p:nvPr/>
+        </p:nvGrpSpPr>
+        <p:grpSpPr>
+          <a:xfrm>
+            <a:off x="4254601" y="1550069"/>
+            <a:ext cx="1301040" cy="1666440"/>
+            <a:chOff x="4254601" y="1550069"/>
+            <a:chExt cx="1301040" cy="1666440"/>
+          </a:xfrm>
+        </p:grpSpPr>
+        <mc:AlternateContent xmlns:mc="http://schemas.openxmlformats.org/markup-compatibility/2006">
+          <mc:Choice xmlns:p14="http://schemas.microsoft.com/office/powerpoint/2010/main" Requires="p14">
+            <p:contentPart p14:bwMode="auto" r:id="rId88">
+              <p14:nvContentPartPr>
+                <p14:cNvPr id="5" name="インク 4">
+                  <a:extLst>
+                    <a:ext uri="{FF2B5EF4-FFF2-40B4-BE49-F238E27FC236}">
+                      <a16:creationId xmlns:a16="http://schemas.microsoft.com/office/drawing/2014/main" id="{5B43C904-E36F-77B7-8B8A-AC539113E56B}"/>
+                    </a:ext>
+                  </a:extLst>
+                </p14:cNvPr>
+                <p14:cNvContentPartPr/>
+                <p14:nvPr/>
+              </p14:nvContentPartPr>
+              <p14:xfrm>
+                <a:off x="4266121" y="1550069"/>
+                <a:ext cx="1289520" cy="1571400"/>
+              </p14:xfrm>
+            </p:contentPart>
+          </mc:Choice>
+          <mc:Fallback>
+            <p:pic>
+              <p:nvPicPr>
+                <p:cNvPr id="5" name="インク 4">
+                  <a:extLst>
+                    <a:ext uri="{FF2B5EF4-FFF2-40B4-BE49-F238E27FC236}">
+                      <a16:creationId xmlns:a16="http://schemas.microsoft.com/office/drawing/2014/main" id="{5B43C904-E36F-77B7-8B8A-AC539113E56B}"/>
+                    </a:ext>
+                  </a:extLst>
+                </p:cNvPr>
+                <p:cNvPicPr/>
+                <p:nvPr/>
+              </p:nvPicPr>
+              <p:blipFill>
+                <a:blip r:embed="rId89"/>
+                <a:stretch>
+                  <a:fillRect/>
+                </a:stretch>
+              </p:blipFill>
+              <p:spPr>
+                <a:xfrm>
+                  <a:off x="4260001" y="1543949"/>
+                  <a:ext cx="1301760" cy="1583640"/>
+                </a:xfrm>
+                <a:prstGeom prst="rect">
+                  <a:avLst/>
+                </a:prstGeom>
+              </p:spPr>
+            </p:pic>
+          </mc:Fallback>
+        </mc:AlternateContent>
+        <mc:AlternateContent xmlns:mc="http://schemas.openxmlformats.org/markup-compatibility/2006">
+          <mc:Choice xmlns:p14="http://schemas.microsoft.com/office/powerpoint/2010/main" Requires="p14">
+            <p:contentPart p14:bwMode="auto" r:id="rId90">
+              <p14:nvContentPartPr>
+                <p14:cNvPr id="11" name="インク 10">
+                  <a:extLst>
+                    <a:ext uri="{FF2B5EF4-FFF2-40B4-BE49-F238E27FC236}">
+                      <a16:creationId xmlns:a16="http://schemas.microsoft.com/office/drawing/2014/main" id="{EE1ED222-B77A-4C1F-231D-AC69A05CD889}"/>
+                    </a:ext>
+                  </a:extLst>
+                </p14:cNvPr>
+                <p14:cNvContentPartPr/>
+                <p14:nvPr/>
+              </p14:nvContentPartPr>
+              <p14:xfrm>
+                <a:off x="4254601" y="3014189"/>
+                <a:ext cx="142920" cy="202320"/>
+              </p14:xfrm>
+            </p:contentPart>
+          </mc:Choice>
+          <mc:Fallback>
+            <p:pic>
+              <p:nvPicPr>
+                <p:cNvPr id="11" name="インク 10">
+                  <a:extLst>
+                    <a:ext uri="{FF2B5EF4-FFF2-40B4-BE49-F238E27FC236}">
+                      <a16:creationId xmlns:a16="http://schemas.microsoft.com/office/drawing/2014/main" id="{EE1ED222-B77A-4C1F-231D-AC69A05CD889}"/>
+                    </a:ext>
+                  </a:extLst>
+                </p:cNvPr>
+                <p:cNvPicPr/>
+                <p:nvPr/>
+              </p:nvPicPr>
+              <p:blipFill>
+                <a:blip r:embed="rId91"/>
+                <a:stretch>
+                  <a:fillRect/>
+                </a:stretch>
+              </p:blipFill>
+              <p:spPr>
+                <a:xfrm>
+                  <a:off x="4248481" y="3008069"/>
+                  <a:ext cx="155160" cy="214560"/>
+                </a:xfrm>
+                <a:prstGeom prst="rect">
+                  <a:avLst/>
+                </a:prstGeom>
+              </p:spPr>
+            </p:pic>
+          </mc:Fallback>
+        </mc:AlternateContent>
+      </p:grpSp>
     </p:spTree>
     <p:extLst>
       <p:ext uri="{BB962C8B-B14F-4D97-AF65-F5344CB8AC3E}">

</xml_diff>